<commit_message>
First draft wireframe complete
</commit_message>
<xml_diff>
--- a/write-ups/website-wireframe/wireframe.pptx
+++ b/write-ups/website-wireframe/wireframe.pptx
@@ -288,7 +288,7 @@
           <a:p>
             <a:fld id="{5033FC35-9855-4B3A-892F-0AC8F645192C}" type="datetimeFigureOut">
               <a:rPr lang="en-US" smtClean="0"/>
-              <a:t>9/7/2014</a:t>
+              <a:t>9/8/2014</a:t>
             </a:fld>
             <a:endParaRPr lang="en-US"/>
           </a:p>
@@ -458,7 +458,7 @@
           <a:p>
             <a:fld id="{5033FC35-9855-4B3A-892F-0AC8F645192C}" type="datetimeFigureOut">
               <a:rPr lang="en-US" smtClean="0"/>
-              <a:t>9/7/2014</a:t>
+              <a:t>9/8/2014</a:t>
             </a:fld>
             <a:endParaRPr lang="en-US"/>
           </a:p>
@@ -638,7 +638,7 @@
           <a:p>
             <a:fld id="{5033FC35-9855-4B3A-892F-0AC8F645192C}" type="datetimeFigureOut">
               <a:rPr lang="en-US" smtClean="0"/>
-              <a:t>9/7/2014</a:t>
+              <a:t>9/8/2014</a:t>
             </a:fld>
             <a:endParaRPr lang="en-US"/>
           </a:p>
@@ -808,7 +808,7 @@
           <a:p>
             <a:fld id="{5033FC35-9855-4B3A-892F-0AC8F645192C}" type="datetimeFigureOut">
               <a:rPr lang="en-US" smtClean="0"/>
-              <a:t>9/7/2014</a:t>
+              <a:t>9/8/2014</a:t>
             </a:fld>
             <a:endParaRPr lang="en-US"/>
           </a:p>
@@ -1054,7 +1054,7 @@
           <a:p>
             <a:fld id="{5033FC35-9855-4B3A-892F-0AC8F645192C}" type="datetimeFigureOut">
               <a:rPr lang="en-US" smtClean="0"/>
-              <a:t>9/7/2014</a:t>
+              <a:t>9/8/2014</a:t>
             </a:fld>
             <a:endParaRPr lang="en-US"/>
           </a:p>
@@ -1342,7 +1342,7 @@
           <a:p>
             <a:fld id="{5033FC35-9855-4B3A-892F-0AC8F645192C}" type="datetimeFigureOut">
               <a:rPr lang="en-US" smtClean="0"/>
-              <a:t>9/7/2014</a:t>
+              <a:t>9/8/2014</a:t>
             </a:fld>
             <a:endParaRPr lang="en-US"/>
           </a:p>
@@ -1764,7 +1764,7 @@
           <a:p>
             <a:fld id="{5033FC35-9855-4B3A-892F-0AC8F645192C}" type="datetimeFigureOut">
               <a:rPr lang="en-US" smtClean="0"/>
-              <a:t>9/7/2014</a:t>
+              <a:t>9/8/2014</a:t>
             </a:fld>
             <a:endParaRPr lang="en-US"/>
           </a:p>
@@ -1882,7 +1882,7 @@
           <a:p>
             <a:fld id="{5033FC35-9855-4B3A-892F-0AC8F645192C}" type="datetimeFigureOut">
               <a:rPr lang="en-US" smtClean="0"/>
-              <a:t>9/7/2014</a:t>
+              <a:t>9/8/2014</a:t>
             </a:fld>
             <a:endParaRPr lang="en-US"/>
           </a:p>
@@ -1977,7 +1977,7 @@
           <a:p>
             <a:fld id="{5033FC35-9855-4B3A-892F-0AC8F645192C}" type="datetimeFigureOut">
               <a:rPr lang="en-US" smtClean="0"/>
-              <a:t>9/7/2014</a:t>
+              <a:t>9/8/2014</a:t>
             </a:fld>
             <a:endParaRPr lang="en-US"/>
           </a:p>
@@ -2254,7 +2254,7 @@
           <a:p>
             <a:fld id="{5033FC35-9855-4B3A-892F-0AC8F645192C}" type="datetimeFigureOut">
               <a:rPr lang="en-US" smtClean="0"/>
-              <a:t>9/7/2014</a:t>
+              <a:t>9/8/2014</a:t>
             </a:fld>
             <a:endParaRPr lang="en-US"/>
           </a:p>
@@ -2507,7 +2507,7 @@
           <a:p>
             <a:fld id="{5033FC35-9855-4B3A-892F-0AC8F645192C}" type="datetimeFigureOut">
               <a:rPr lang="en-US" smtClean="0"/>
-              <a:t>9/7/2014</a:t>
+              <a:t>9/8/2014</a:t>
             </a:fld>
             <a:endParaRPr lang="en-US"/>
           </a:p>
@@ -2720,7 +2720,7 @@
           <a:p>
             <a:fld id="{5033FC35-9855-4B3A-892F-0AC8F645192C}" type="datetimeFigureOut">
               <a:rPr lang="en-US" smtClean="0"/>
-              <a:t>9/7/2014</a:t>
+              <a:t>9/8/2014</a:t>
             </a:fld>
             <a:endParaRPr lang="en-US"/>
           </a:p>
@@ -3103,7 +3103,7 @@
         </p:nvSpPr>
         <p:spPr>
           <a:xfrm>
-            <a:off x="76200" y="228600"/>
+            <a:off x="289560" y="87630"/>
             <a:ext cx="6553200" cy="415498"/>
           </a:xfrm>
           <a:prstGeom prst="rect">
@@ -3147,7 +3147,7 @@
         </p:blipFill>
         <p:spPr>
           <a:xfrm>
-            <a:off x="3124200" y="918000"/>
+            <a:off x="3124200" y="571498"/>
             <a:ext cx="3433108" cy="3723127"/>
           </a:xfrm>
           <a:prstGeom prst="rect">
@@ -3163,7 +3163,7 @@
         </p:nvSpPr>
         <p:spPr>
           <a:xfrm>
-            <a:off x="152400" y="918000"/>
+            <a:off x="152400" y="571498"/>
             <a:ext cx="2743200" cy="3723127"/>
           </a:xfrm>
           <a:prstGeom prst="rect">
@@ -3211,7 +3211,7 @@
         </p:nvSpPr>
         <p:spPr>
           <a:xfrm>
-            <a:off x="129540" y="918210"/>
+            <a:off x="129540" y="571708"/>
             <a:ext cx="2590800" cy="307777"/>
           </a:xfrm>
           <a:prstGeom prst="rect">
@@ -3241,8 +3241,8 @@
         </p:nvGrpSpPr>
         <p:grpSpPr>
           <a:xfrm>
-            <a:off x="186690" y="1147963"/>
-            <a:ext cx="2175510" cy="356987"/>
+            <a:off x="186690" y="801461"/>
+            <a:ext cx="2480310" cy="356987"/>
             <a:chOff x="186690" y="1147963"/>
             <a:chExt cx="2175510" cy="356987"/>
           </a:xfrm>
@@ -3256,7 +3256,7 @@
           <p:spPr>
             <a:xfrm>
               <a:off x="186690" y="1147963"/>
-              <a:ext cx="2175510" cy="215444"/>
+              <a:ext cx="2175510" cy="338554"/>
             </a:xfrm>
             <a:prstGeom prst="rect">
               <a:avLst/>
@@ -3271,15 +3271,11 @@
             <a:p>
               <a:r>
                 <a:rPr lang="en-US" sz="800" dirty="0" smtClean="0"/>
-                <a:t>Weight for </a:t>
+                <a:t>Targeting score for enrolling youth </a:t>
               </a:r>
               <a:r>
                 <a:rPr lang="en-US" sz="800" dirty="0" smtClean="0"/>
-                <a:t>attracting </a:t>
-              </a:r>
-              <a:r>
-                <a:rPr lang="en-US" sz="800" dirty="0" smtClean="0"/>
-                <a:t>youth between 0-50% FPL</a:t>
+                <a:t>between 0-50% FPL</a:t>
               </a:r>
               <a:endParaRPr lang="en-US" sz="800" dirty="0"/>
             </a:p>
@@ -3324,8 +3320,8 @@
         </p:nvGrpSpPr>
         <p:grpSpPr>
           <a:xfrm>
-            <a:off x="186690" y="1560713"/>
-            <a:ext cx="2327910" cy="356987"/>
+            <a:off x="186690" y="1214211"/>
+            <a:ext cx="2556510" cy="356987"/>
             <a:chOff x="186690" y="1147963"/>
             <a:chExt cx="2327910" cy="356987"/>
           </a:xfrm>
@@ -3339,7 +3335,7 @@
           <p:spPr>
             <a:xfrm>
               <a:off x="186690" y="1147963"/>
-              <a:ext cx="2327910" cy="215444"/>
+              <a:ext cx="2327910" cy="338554"/>
             </a:xfrm>
             <a:prstGeom prst="rect">
               <a:avLst/>
@@ -3354,15 +3350,11 @@
             <a:p>
               <a:r>
                 <a:rPr lang="en-US" sz="800" dirty="0" smtClean="0"/>
-                <a:t>Weight for </a:t>
+                <a:t>Targeting score for enrolling youth </a:t>
               </a:r>
               <a:r>
                 <a:rPr lang="en-US" sz="800" dirty="0" smtClean="0"/>
-                <a:t>attracting </a:t>
-              </a:r>
-              <a:r>
-                <a:rPr lang="en-US" sz="800" dirty="0" smtClean="0"/>
-                <a:t>youth between 50-100% FPL</a:t>
+                <a:t>between 50-100% FPL</a:t>
               </a:r>
               <a:endParaRPr lang="en-US" sz="800" dirty="0"/>
             </a:p>
@@ -3407,8 +3399,8 @@
         </p:nvGrpSpPr>
         <p:grpSpPr>
           <a:xfrm>
-            <a:off x="186690" y="1973463"/>
-            <a:ext cx="2327910" cy="356987"/>
+            <a:off x="186690" y="1626961"/>
+            <a:ext cx="2632710" cy="356987"/>
             <a:chOff x="186690" y="1147963"/>
             <a:chExt cx="2327910" cy="356987"/>
           </a:xfrm>
@@ -3422,7 +3414,7 @@
           <p:spPr>
             <a:xfrm>
               <a:off x="186690" y="1147963"/>
-              <a:ext cx="2327910" cy="215444"/>
+              <a:ext cx="2327910" cy="338554"/>
             </a:xfrm>
             <a:prstGeom prst="rect">
               <a:avLst/>
@@ -3437,7 +3429,11 @@
             <a:p>
               <a:r>
                 <a:rPr lang="en-US" sz="800" dirty="0" smtClean="0"/>
-                <a:t>Weight for attracting youth between 100-200% FPL</a:t>
+                <a:t>Targeting score for enrolling youth </a:t>
+              </a:r>
+              <a:r>
+                <a:rPr lang="en-US" sz="800" dirty="0" smtClean="0"/>
+                <a:t>between 100-200% FPL</a:t>
               </a:r>
               <a:endParaRPr lang="en-US" sz="800" dirty="0"/>
             </a:p>
@@ -3482,10 +3478,10 @@
         </p:nvGrpSpPr>
         <p:grpSpPr>
           <a:xfrm>
-            <a:off x="186690" y="2386213"/>
-            <a:ext cx="2404110" cy="356987"/>
+            <a:off x="186690" y="2039711"/>
+            <a:ext cx="2632710" cy="356987"/>
             <a:chOff x="186690" y="1147963"/>
-            <a:chExt cx="2404110" cy="356987"/>
+            <a:chExt cx="2632710" cy="356987"/>
           </a:xfrm>
         </p:grpSpPr>
         <p:sp>
@@ -3497,7 +3493,7 @@
           <p:spPr>
             <a:xfrm>
               <a:off x="186690" y="1147963"/>
-              <a:ext cx="2404110" cy="215444"/>
+              <a:ext cx="2632710" cy="215444"/>
             </a:xfrm>
             <a:prstGeom prst="rect">
               <a:avLst/>
@@ -3512,7 +3508,11 @@
             <a:p>
               <a:r>
                 <a:rPr lang="en-US" sz="800" dirty="0" smtClean="0"/>
-                <a:t>Weight for attracting youth greater than 200% FPL</a:t>
+                <a:t>Targeting score for enrolling youth </a:t>
+              </a:r>
+              <a:r>
+                <a:rPr lang="en-US" sz="800" dirty="0" smtClean="0"/>
+                <a:t>greater than 200% FPL</a:t>
               </a:r>
               <a:endParaRPr lang="en-US" sz="800" dirty="0"/>
             </a:p>
@@ -3557,8 +3557,8 @@
         </p:nvSpPr>
         <p:spPr>
           <a:xfrm>
-            <a:off x="228600" y="1177290"/>
-            <a:ext cx="2438400" cy="1600200"/>
+            <a:off x="228600" y="830788"/>
+            <a:ext cx="2590800" cy="1600200"/>
           </a:xfrm>
           <a:prstGeom prst="rect">
             <a:avLst/>
@@ -3603,7 +3603,7 @@
         </p:nvGrpSpPr>
         <p:grpSpPr>
           <a:xfrm>
-            <a:off x="186690" y="2843413"/>
+            <a:off x="186690" y="2496911"/>
             <a:ext cx="1981200" cy="356987"/>
             <a:chOff x="186690" y="1147963"/>
             <a:chExt cx="1981200" cy="356987"/>
@@ -3633,9 +3633,8 @@
             <a:p>
               <a:r>
                 <a:rPr lang="en-US" sz="800" dirty="0" smtClean="0"/>
-                <a:t>Weight placed on youth enrolling nearby</a:t>
+                <a:t>Total staff available to allocate</a:t>
               </a:r>
-              <a:endParaRPr lang="en-US" sz="800" dirty="0"/>
             </a:p>
           </p:txBody>
         </p:sp>
@@ -3670,6 +3669,607 @@
           </p:spPr>
         </p:pic>
       </p:grpSp>
+      <p:sp>
+        <p:nvSpPr>
+          <p:cNvPr id="27" name="TextBox 26"/>
+          <p:cNvSpPr txBox="1"/>
+          <p:nvPr/>
+        </p:nvSpPr>
+        <p:spPr>
+          <a:xfrm>
+            <a:off x="186690" y="2877911"/>
+            <a:ext cx="2632710" cy="338554"/>
+          </a:xfrm>
+          <a:prstGeom prst="rect">
+            <a:avLst/>
+          </a:prstGeom>
+          <a:noFill/>
+        </p:spPr>
+        <p:txBody>
+          <a:bodyPr wrap="square" rtlCol="0">
+            <a:spAutoFit/>
+          </a:bodyPr>
+          <a:lstStyle/>
+          <a:p>
+            <a:r>
+              <a:rPr lang="en-US" sz="800" dirty="0" smtClean="0"/>
+              <a:t>Number of iterations to run </a:t>
+            </a:r>
+            <a:r>
+              <a:rPr lang="en-US" sz="800" dirty="0" smtClean="0">
+                <a:solidFill>
+                  <a:schemeClr val="bg1">
+                    <a:lumMod val="65000"/>
+                  </a:schemeClr>
+                </a:solidFill>
+              </a:rPr>
+              <a:t>(Larger numbers increase run time, but can help find better solutions)</a:t>
+            </a:r>
+            <a:endParaRPr lang="en-US" sz="800" dirty="0" smtClean="0">
+              <a:solidFill>
+                <a:schemeClr val="bg1">
+                  <a:lumMod val="65000"/>
+                </a:schemeClr>
+              </a:solidFill>
+            </a:endParaRPr>
+          </a:p>
+        </p:txBody>
+      </p:sp>
+      <p:pic>
+        <p:nvPicPr>
+          <p:cNvPr id="29" name="Picture 28"/>
+          <p:cNvPicPr>
+            <a:picLocks noChangeAspect="1"/>
+          </p:cNvPicPr>
+          <p:nvPr/>
+        </p:nvPicPr>
+        <p:blipFill>
+          <a:blip r:embed="rId3" cstate="print">
+            <a:extLst>
+              <a:ext uri="{28A0092B-C50C-407E-A947-70E740481C1C}">
+                <a14:useLocalDpi xmlns:a14="http://schemas.microsoft.com/office/drawing/2010/main" val="0"/>
+              </a:ext>
+            </a:extLst>
+          </a:blip>
+          <a:stretch>
+            <a:fillRect/>
+          </a:stretch>
+        </p:blipFill>
+        <p:spPr>
+          <a:xfrm>
+            <a:off x="381000" y="3212038"/>
+            <a:ext cx="990600" cy="166487"/>
+          </a:xfrm>
+          <a:prstGeom prst="rect">
+            <a:avLst/>
+          </a:prstGeom>
+        </p:spPr>
+      </p:pic>
+      <p:pic>
+        <p:nvPicPr>
+          <p:cNvPr id="1026" name="Picture 2"/>
+          <p:cNvPicPr>
+            <a:picLocks noChangeAspect="1" noChangeArrowheads="1"/>
+          </p:cNvPicPr>
+          <p:nvPr/>
+        </p:nvPicPr>
+        <p:blipFill>
+          <a:blip r:embed="rId4">
+            <a:extLst>
+              <a:ext uri="{28A0092B-C50C-407E-A947-70E740481C1C}">
+                <a14:useLocalDpi xmlns:a14="http://schemas.microsoft.com/office/drawing/2010/main" val="0"/>
+              </a:ext>
+            </a:extLst>
+          </a:blip>
+          <a:stretch>
+            <a:fillRect/>
+          </a:stretch>
+        </p:blipFill>
+        <p:spPr bwMode="auto">
+          <a:xfrm>
+            <a:off x="152400" y="4401126"/>
+            <a:ext cx="3586790" cy="2152073"/>
+          </a:xfrm>
+          <a:prstGeom prst="rect">
+            <a:avLst/>
+          </a:prstGeom>
+          <a:noFill/>
+          <a:ln>
+            <a:noFill/>
+          </a:ln>
+          <a:effectLst/>
+          <a:extLst>
+            <a:ext uri="{909E8E84-426E-40DD-AFC4-6F175D3DCCD1}">
+              <a14:hiddenFill xmlns:a14="http://schemas.microsoft.com/office/drawing/2010/main">
+                <a:solidFill>
+                  <a:schemeClr val="accent1"/>
+                </a:solidFill>
+              </a14:hiddenFill>
+            </a:ext>
+            <a:ext uri="{91240B29-F687-4F45-9708-019B960494DF}">
+              <a14:hiddenLine xmlns:a14="http://schemas.microsoft.com/office/drawing/2010/main" w="9525">
+                <a:solidFill>
+                  <a:schemeClr val="tx1"/>
+                </a:solidFill>
+                <a:miter lim="800000"/>
+                <a:headEnd/>
+                <a:tailEnd/>
+              </a14:hiddenLine>
+            </a:ext>
+            <a:ext uri="{AF507438-7753-43E0-B8FC-AC1667EBCBE1}">
+              <a14:hiddenEffects xmlns:a14="http://schemas.microsoft.com/office/drawing/2010/main">
+                <a:effectLst>
+                  <a:outerShdw dist="35921" dir="2700000" algn="ctr" rotWithShape="0">
+                    <a:schemeClr val="bg2"/>
+                  </a:outerShdw>
+                </a:effectLst>
+              </a14:hiddenEffects>
+            </a:ext>
+          </a:extLst>
+        </p:spPr>
+      </p:pic>
+      <p:pic>
+        <p:nvPicPr>
+          <p:cNvPr id="3" name="Picture 2"/>
+          <p:cNvPicPr>
+            <a:picLocks noChangeAspect="1"/>
+          </p:cNvPicPr>
+          <p:nvPr/>
+        </p:nvPicPr>
+        <p:blipFill>
+          <a:blip r:embed="rId5" cstate="print">
+            <a:extLst>
+              <a:ext uri="{28A0092B-C50C-407E-A947-70E740481C1C}">
+                <a14:useLocalDpi xmlns:a14="http://schemas.microsoft.com/office/drawing/2010/main" val="0"/>
+              </a:ext>
+            </a:extLst>
+          </a:blip>
+          <a:stretch>
+            <a:fillRect/>
+          </a:stretch>
+        </p:blipFill>
+        <p:spPr>
+          <a:xfrm>
+            <a:off x="1462920" y="3905221"/>
+            <a:ext cx="1379340" cy="339119"/>
+          </a:xfrm>
+          <a:prstGeom prst="rect">
+            <a:avLst/>
+          </a:prstGeom>
+        </p:spPr>
+      </p:pic>
+      <p:grpSp>
+        <p:nvGrpSpPr>
+          <p:cNvPr id="31" name="Group 30"/>
+          <p:cNvGrpSpPr/>
+          <p:nvPr/>
+        </p:nvGrpSpPr>
+        <p:grpSpPr>
+          <a:xfrm>
+            <a:off x="2057400" y="2286000"/>
+            <a:ext cx="2419350" cy="450156"/>
+            <a:chOff x="2057400" y="2320498"/>
+            <a:chExt cx="2419350" cy="450156"/>
+          </a:xfrm>
+        </p:grpSpPr>
+        <p:sp>
+          <p:nvSpPr>
+            <p:cNvPr id="10" name="Rectangle 9"/>
+            <p:cNvSpPr/>
+            <p:nvPr/>
+          </p:nvSpPr>
+          <p:spPr>
+            <a:xfrm>
+              <a:off x="2057400" y="2320498"/>
+              <a:ext cx="2286000" cy="450156"/>
+            </a:xfrm>
+            <a:prstGeom prst="rect">
+              <a:avLst/>
+            </a:prstGeom>
+            <a:solidFill>
+              <a:schemeClr val="bg1">
+                <a:alpha val="80000"/>
+              </a:schemeClr>
+            </a:solidFill>
+            <a:ln w="9525"/>
+          </p:spPr>
+          <p:style>
+            <a:lnRef idx="2">
+              <a:schemeClr val="accent1">
+                <a:shade val="50000"/>
+              </a:schemeClr>
+            </a:lnRef>
+            <a:fillRef idx="1">
+              <a:schemeClr val="accent1"/>
+            </a:fillRef>
+            <a:effectRef idx="0">
+              <a:schemeClr val="accent1"/>
+            </a:effectRef>
+            <a:fontRef idx="minor">
+              <a:schemeClr val="lt1"/>
+            </a:fontRef>
+          </p:style>
+          <p:txBody>
+            <a:bodyPr rtlCol="0" anchor="ctr"/>
+            <a:lstStyle/>
+            <a:p>
+              <a:pPr algn="ctr"/>
+              <a:endParaRPr lang="en-US"/>
+            </a:p>
+          </p:txBody>
+        </p:sp>
+        <p:pic>
+          <p:nvPicPr>
+            <p:cNvPr id="2" name="Picture 1"/>
+            <p:cNvPicPr>
+              <a:picLocks noChangeAspect="1"/>
+            </p:cNvPicPr>
+            <p:nvPr/>
+          </p:nvPicPr>
+          <p:blipFill>
+            <a:blip r:embed="rId6" cstate="print">
+              <a:extLst>
+                <a:ext uri="{28A0092B-C50C-407E-A947-70E740481C1C}">
+                  <a14:useLocalDpi xmlns:a14="http://schemas.microsoft.com/office/drawing/2010/main" val="0"/>
+                </a:ext>
+              </a:extLst>
+            </a:blip>
+            <a:stretch>
+              <a:fillRect/>
+            </a:stretch>
+          </p:blipFill>
+          <p:spPr>
+            <a:xfrm>
+              <a:off x="2190751" y="2533832"/>
+              <a:ext cx="2000250" cy="202098"/>
+            </a:xfrm>
+            <a:prstGeom prst="rect">
+              <a:avLst/>
+            </a:prstGeom>
+          </p:spPr>
+        </p:pic>
+        <p:sp>
+          <p:nvSpPr>
+            <p:cNvPr id="11" name="TextBox 10"/>
+            <p:cNvSpPr txBox="1"/>
+            <p:nvPr/>
+          </p:nvSpPr>
+          <p:spPr>
+            <a:xfrm>
+              <a:off x="2133600" y="2335738"/>
+              <a:ext cx="2343150" cy="215444"/>
+            </a:xfrm>
+            <a:prstGeom prst="rect">
+              <a:avLst/>
+            </a:prstGeom>
+            <a:noFill/>
+          </p:spPr>
+          <p:txBody>
+            <a:bodyPr wrap="square" rtlCol="0">
+              <a:spAutoFit/>
+            </a:bodyPr>
+            <a:lstStyle/>
+            <a:p>
+              <a:r>
+                <a:rPr lang="en-US" sz="800" dirty="0" smtClean="0"/>
+                <a:t>Running CANOPY Iteration 38,000 of 100,000</a:t>
+              </a:r>
+              <a:endParaRPr lang="en-US" sz="800" dirty="0"/>
+            </a:p>
+          </p:txBody>
+        </p:sp>
+      </p:grpSp>
+      <p:sp>
+        <p:nvSpPr>
+          <p:cNvPr id="32" name="TextBox 31"/>
+          <p:cNvSpPr txBox="1"/>
+          <p:nvPr/>
+        </p:nvSpPr>
+        <p:spPr>
+          <a:xfrm>
+            <a:off x="3810000" y="4572000"/>
+            <a:ext cx="2743200" cy="3016210"/>
+          </a:xfrm>
+          <a:prstGeom prst="rect">
+            <a:avLst/>
+          </a:prstGeom>
+          <a:noFill/>
+        </p:spPr>
+        <p:txBody>
+          <a:bodyPr wrap="square" rtlCol="0">
+            <a:spAutoFit/>
+          </a:bodyPr>
+          <a:lstStyle/>
+          <a:p>
+            <a:r>
+              <a:rPr lang="en-US" sz="1000" dirty="0" smtClean="0"/>
+              <a:t>The overall Targeting Score (TS) is calculated as the total number of expected youth expected to participate in programming, where each youth is weighted by the targeting score for their classification, determined above.</a:t>
+            </a:r>
+          </a:p>
+          <a:p>
+            <a:endParaRPr lang="en-US" sz="1000" dirty="0"/>
+          </a:p>
+          <a:p>
+            <a:pPr marL="171450" indent="-171450">
+              <a:buFont typeface="Arial" panose="020B0604020202020204" pitchFamily="34" charset="0"/>
+              <a:buChar char="•"/>
+            </a:pPr>
+            <a:r>
+              <a:rPr lang="en-US" sz="1000" dirty="0" smtClean="0"/>
+              <a:t>The “Uniform Allocation Option” is the TS obtained by evenly (as possible) distributing resources across all sites.</a:t>
+            </a:r>
+          </a:p>
+          <a:p>
+            <a:pPr marL="171450" indent="-171450">
+              <a:buFont typeface="Arial" panose="020B0604020202020204" pitchFamily="34" charset="0"/>
+              <a:buChar char="•"/>
+            </a:pPr>
+            <a:r>
+              <a:rPr lang="en-US" sz="1000" dirty="0" smtClean="0"/>
+              <a:t>The “</a:t>
+            </a:r>
+            <a:r>
+              <a:rPr lang="en-US" sz="1000" dirty="0" err="1" smtClean="0"/>
+              <a:t>Alloc</a:t>
+            </a:r>
+            <a:r>
+              <a:rPr lang="en-US" sz="1000" dirty="0" smtClean="0"/>
+              <a:t> proportional to pop density” TS is based on allocating resources to sites in proportion to the population density within 1 mile of the site.</a:t>
+            </a:r>
+          </a:p>
+          <a:p>
+            <a:pPr marL="171450" indent="-171450">
+              <a:buFont typeface="Arial" panose="020B0604020202020204" pitchFamily="34" charset="0"/>
+              <a:buChar char="•"/>
+            </a:pPr>
+            <a:r>
+              <a:rPr lang="en-US" sz="1000" dirty="0" smtClean="0"/>
+              <a:t>The “</a:t>
+            </a:r>
+            <a:r>
+              <a:rPr lang="en-US" sz="1000" dirty="0" err="1" smtClean="0"/>
+              <a:t>Alloc</a:t>
+            </a:r>
+            <a:r>
+              <a:rPr lang="en-US" sz="1000" dirty="0" smtClean="0"/>
+              <a:t> proportional to poverty” TS is based on allocating resources to sites in proportion to the poverty rate within 1 mile of the site.</a:t>
+            </a:r>
+          </a:p>
+          <a:p>
+            <a:pPr marL="171450" indent="-171450">
+              <a:buFont typeface="Arial" panose="020B0604020202020204" pitchFamily="34" charset="0"/>
+              <a:buChar char="•"/>
+            </a:pPr>
+            <a:r>
+              <a:rPr lang="en-US" sz="1000" dirty="0" smtClean="0"/>
+              <a:t>The CANOPY TS is what was obtained in the most recent run of the CANOPY algorithm</a:t>
+            </a:r>
+            <a:endParaRPr lang="en-US" sz="1000" dirty="0"/>
+          </a:p>
+        </p:txBody>
+      </p:sp>
+      <p:sp>
+        <p:nvSpPr>
+          <p:cNvPr id="33" name="Rectangle 32"/>
+          <p:cNvSpPr/>
+          <p:nvPr/>
+        </p:nvSpPr>
+        <p:spPr>
+          <a:xfrm>
+            <a:off x="152400" y="4419600"/>
+            <a:ext cx="6404908" cy="4495800"/>
+          </a:xfrm>
+          <a:prstGeom prst="rect">
+            <a:avLst/>
+          </a:prstGeom>
+          <a:noFill/>
+          <a:ln w="9525">
+            <a:solidFill>
+              <a:schemeClr val="tx1"/>
+            </a:solidFill>
+          </a:ln>
+        </p:spPr>
+        <p:style>
+          <a:lnRef idx="2">
+            <a:schemeClr val="accent1">
+              <a:shade val="50000"/>
+            </a:schemeClr>
+          </a:lnRef>
+          <a:fillRef idx="1">
+            <a:schemeClr val="accent1"/>
+          </a:fillRef>
+          <a:effectRef idx="0">
+            <a:schemeClr val="accent1"/>
+          </a:effectRef>
+          <a:fontRef idx="minor">
+            <a:schemeClr val="lt1"/>
+          </a:fontRef>
+        </p:style>
+        <p:txBody>
+          <a:bodyPr rtlCol="0" anchor="ctr"/>
+          <a:lstStyle/>
+          <a:p>
+            <a:pPr algn="ctr"/>
+            <a:endParaRPr lang="en-US"/>
+          </a:p>
+        </p:txBody>
+      </p:sp>
+      <p:sp>
+        <p:nvSpPr>
+          <p:cNvPr id="35" name="TextBox 34"/>
+          <p:cNvSpPr txBox="1"/>
+          <p:nvPr/>
+        </p:nvSpPr>
+        <p:spPr>
+          <a:xfrm>
+            <a:off x="186690" y="3401385"/>
+            <a:ext cx="2632710" cy="461665"/>
+          </a:xfrm>
+          <a:prstGeom prst="rect">
+            <a:avLst/>
+          </a:prstGeom>
+          <a:noFill/>
+        </p:spPr>
+        <p:txBody>
+          <a:bodyPr wrap="square" rtlCol="0">
+            <a:spAutoFit/>
+          </a:bodyPr>
+          <a:lstStyle/>
+          <a:p>
+            <a:r>
+              <a:rPr lang="en-US" sz="800" dirty="0" smtClean="0"/>
+              <a:t>Min resources per site:</a:t>
+            </a:r>
+          </a:p>
+          <a:p>
+            <a:endParaRPr lang="en-US" sz="800" dirty="0">
+              <a:solidFill>
+                <a:schemeClr val="bg1">
+                  <a:lumMod val="65000"/>
+                </a:schemeClr>
+              </a:solidFill>
+            </a:endParaRPr>
+          </a:p>
+          <a:p>
+            <a:r>
+              <a:rPr lang="en-US" sz="800" dirty="0" smtClean="0"/>
+              <a:t>Max resources per site:</a:t>
+            </a:r>
+          </a:p>
+        </p:txBody>
+      </p:sp>
+      <p:sp>
+        <p:nvSpPr>
+          <p:cNvPr id="34" name="TextBox 33"/>
+          <p:cNvSpPr txBox="1"/>
+          <p:nvPr/>
+        </p:nvSpPr>
+        <p:spPr>
+          <a:xfrm>
+            <a:off x="1312545" y="3409950"/>
+            <a:ext cx="146685" cy="215444"/>
+          </a:xfrm>
+          <a:prstGeom prst="rect">
+            <a:avLst/>
+          </a:prstGeom>
+          <a:noFill/>
+          <a:ln w="3175">
+            <a:solidFill>
+              <a:schemeClr val="tx1"/>
+            </a:solidFill>
+          </a:ln>
+        </p:spPr>
+        <p:txBody>
+          <a:bodyPr wrap="square" rtlCol="0">
+            <a:spAutoFit/>
+          </a:bodyPr>
+          <a:lstStyle/>
+          <a:p>
+            <a:pPr algn="ctr"/>
+            <a:r>
+              <a:rPr lang="en-US" sz="800" dirty="0" smtClean="0"/>
+              <a:t>0</a:t>
+            </a:r>
+            <a:endParaRPr lang="en-US" sz="800" dirty="0"/>
+          </a:p>
+        </p:txBody>
+      </p:sp>
+      <p:sp>
+        <p:nvSpPr>
+          <p:cNvPr id="38" name="TextBox 37"/>
+          <p:cNvSpPr txBox="1"/>
+          <p:nvPr/>
+        </p:nvSpPr>
+        <p:spPr>
+          <a:xfrm>
+            <a:off x="1312545" y="3649980"/>
+            <a:ext cx="146685" cy="215444"/>
+          </a:xfrm>
+          <a:prstGeom prst="rect">
+            <a:avLst/>
+          </a:prstGeom>
+          <a:noFill/>
+          <a:ln w="3175">
+            <a:solidFill>
+              <a:schemeClr val="tx1"/>
+            </a:solidFill>
+          </a:ln>
+        </p:spPr>
+        <p:txBody>
+          <a:bodyPr wrap="square" rtlCol="0">
+            <a:spAutoFit/>
+          </a:bodyPr>
+          <a:lstStyle/>
+          <a:p>
+            <a:pPr algn="ctr"/>
+            <a:r>
+              <a:rPr lang="en-US" sz="800" dirty="0" smtClean="0"/>
+              <a:t>7</a:t>
+            </a:r>
+            <a:endParaRPr lang="en-US" sz="800" dirty="0"/>
+          </a:p>
+        </p:txBody>
+      </p:sp>
+      <p:pic>
+        <p:nvPicPr>
+          <p:cNvPr id="37" name="Picture 36"/>
+          <p:cNvPicPr>
+            <a:picLocks noChangeAspect="1"/>
+          </p:cNvPicPr>
+          <p:nvPr/>
+        </p:nvPicPr>
+        <p:blipFill>
+          <a:blip r:embed="rId7" cstate="print">
+            <a:extLst>
+              <a:ext uri="{28A0092B-C50C-407E-A947-70E740481C1C}">
+                <a14:useLocalDpi xmlns:a14="http://schemas.microsoft.com/office/drawing/2010/main" val="0"/>
+              </a:ext>
+            </a:extLst>
+          </a:blip>
+          <a:stretch>
+            <a:fillRect/>
+          </a:stretch>
+        </p:blipFill>
+        <p:spPr>
+          <a:xfrm>
+            <a:off x="294954" y="6626071"/>
+            <a:ext cx="3473136" cy="1393979"/>
+          </a:xfrm>
+          <a:prstGeom prst="rect">
+            <a:avLst/>
+          </a:prstGeom>
+        </p:spPr>
+      </p:pic>
+      <p:pic>
+        <p:nvPicPr>
+          <p:cNvPr id="40" name="Picture 39"/>
+          <p:cNvPicPr>
+            <a:picLocks noChangeAspect="1"/>
+          </p:cNvPicPr>
+          <p:nvPr/>
+        </p:nvPicPr>
+        <p:blipFill>
+          <a:blip r:embed="rId8" cstate="print">
+            <a:extLst>
+              <a:ext uri="{28A0092B-C50C-407E-A947-70E740481C1C}">
+                <a14:useLocalDpi xmlns:a14="http://schemas.microsoft.com/office/drawing/2010/main" val="0"/>
+              </a:ext>
+            </a:extLst>
+          </a:blip>
+          <a:stretch>
+            <a:fillRect/>
+          </a:stretch>
+        </p:blipFill>
+        <p:spPr>
+          <a:xfrm>
+            <a:off x="3276600" y="8050530"/>
+            <a:ext cx="491489" cy="491489"/>
+          </a:xfrm>
+          <a:prstGeom prst="rect">
+            <a:avLst/>
+          </a:prstGeom>
+        </p:spPr>
+      </p:pic>
     </p:spTree>
     <p:extLst>
       <p:ext uri="{BB962C8B-B14F-4D97-AF65-F5344CB8AC3E}">

</xml_diff>

<commit_message>
Finished refactoring code: is now working
</commit_message>
<xml_diff>
--- a/write-ups/website-wireframe/wireframe.pptx
+++ b/write-ups/website-wireframe/wireframe.pptx
@@ -288,7 +288,7 @@
           <a:p>
             <a:fld id="{5033FC35-9855-4B3A-892F-0AC8F645192C}" type="datetimeFigureOut">
               <a:rPr lang="en-US" smtClean="0"/>
-              <a:t>9/8/2014</a:t>
+              <a:t>9/9/2014</a:t>
             </a:fld>
             <a:endParaRPr lang="en-US"/>
           </a:p>
@@ -458,7 +458,7 @@
           <a:p>
             <a:fld id="{5033FC35-9855-4B3A-892F-0AC8F645192C}" type="datetimeFigureOut">
               <a:rPr lang="en-US" smtClean="0"/>
-              <a:t>9/8/2014</a:t>
+              <a:t>9/9/2014</a:t>
             </a:fld>
             <a:endParaRPr lang="en-US"/>
           </a:p>
@@ -638,7 +638,7 @@
           <a:p>
             <a:fld id="{5033FC35-9855-4B3A-892F-0AC8F645192C}" type="datetimeFigureOut">
               <a:rPr lang="en-US" smtClean="0"/>
-              <a:t>9/8/2014</a:t>
+              <a:t>9/9/2014</a:t>
             </a:fld>
             <a:endParaRPr lang="en-US"/>
           </a:p>
@@ -808,7 +808,7 @@
           <a:p>
             <a:fld id="{5033FC35-9855-4B3A-892F-0AC8F645192C}" type="datetimeFigureOut">
               <a:rPr lang="en-US" smtClean="0"/>
-              <a:t>9/8/2014</a:t>
+              <a:t>9/9/2014</a:t>
             </a:fld>
             <a:endParaRPr lang="en-US"/>
           </a:p>
@@ -1054,7 +1054,7 @@
           <a:p>
             <a:fld id="{5033FC35-9855-4B3A-892F-0AC8F645192C}" type="datetimeFigureOut">
               <a:rPr lang="en-US" smtClean="0"/>
-              <a:t>9/8/2014</a:t>
+              <a:t>9/9/2014</a:t>
             </a:fld>
             <a:endParaRPr lang="en-US"/>
           </a:p>
@@ -1342,7 +1342,7 @@
           <a:p>
             <a:fld id="{5033FC35-9855-4B3A-892F-0AC8F645192C}" type="datetimeFigureOut">
               <a:rPr lang="en-US" smtClean="0"/>
-              <a:t>9/8/2014</a:t>
+              <a:t>9/9/2014</a:t>
             </a:fld>
             <a:endParaRPr lang="en-US"/>
           </a:p>
@@ -1764,7 +1764,7 @@
           <a:p>
             <a:fld id="{5033FC35-9855-4B3A-892F-0AC8F645192C}" type="datetimeFigureOut">
               <a:rPr lang="en-US" smtClean="0"/>
-              <a:t>9/8/2014</a:t>
+              <a:t>9/9/2014</a:t>
             </a:fld>
             <a:endParaRPr lang="en-US"/>
           </a:p>
@@ -1882,7 +1882,7 @@
           <a:p>
             <a:fld id="{5033FC35-9855-4B3A-892F-0AC8F645192C}" type="datetimeFigureOut">
               <a:rPr lang="en-US" smtClean="0"/>
-              <a:t>9/8/2014</a:t>
+              <a:t>9/9/2014</a:t>
             </a:fld>
             <a:endParaRPr lang="en-US"/>
           </a:p>
@@ -1977,7 +1977,7 @@
           <a:p>
             <a:fld id="{5033FC35-9855-4B3A-892F-0AC8F645192C}" type="datetimeFigureOut">
               <a:rPr lang="en-US" smtClean="0"/>
-              <a:t>9/8/2014</a:t>
+              <a:t>9/9/2014</a:t>
             </a:fld>
             <a:endParaRPr lang="en-US"/>
           </a:p>
@@ -2254,7 +2254,7 @@
           <a:p>
             <a:fld id="{5033FC35-9855-4B3A-892F-0AC8F645192C}" type="datetimeFigureOut">
               <a:rPr lang="en-US" smtClean="0"/>
-              <a:t>9/8/2014</a:t>
+              <a:t>9/9/2014</a:t>
             </a:fld>
             <a:endParaRPr lang="en-US"/>
           </a:p>
@@ -2507,7 +2507,7 @@
           <a:p>
             <a:fld id="{5033FC35-9855-4B3A-892F-0AC8F645192C}" type="datetimeFigureOut">
               <a:rPr lang="en-US" smtClean="0"/>
-              <a:t>9/8/2014</a:t>
+              <a:t>9/9/2014</a:t>
             </a:fld>
             <a:endParaRPr lang="en-US"/>
           </a:p>
@@ -2720,7 +2720,7 @@
           <a:p>
             <a:fld id="{5033FC35-9855-4B3A-892F-0AC8F645192C}" type="datetimeFigureOut">
               <a:rPr lang="en-US" smtClean="0"/>
-              <a:t>9/8/2014</a:t>
+              <a:t>9/9/2014</a:t>
             </a:fld>
             <a:endParaRPr lang="en-US"/>
           </a:p>
@@ -3271,11 +3271,7 @@
             <a:p>
               <a:r>
                 <a:rPr lang="en-US" sz="800" dirty="0" smtClean="0"/>
-                <a:t>Targeting score for enrolling youth </a:t>
-              </a:r>
-              <a:r>
-                <a:rPr lang="en-US" sz="800" dirty="0" smtClean="0"/>
-                <a:t>between 0-50% FPL</a:t>
+                <a:t>Targeting score for enrolling youth between 0-50% FPL</a:t>
               </a:r>
               <a:endParaRPr lang="en-US" sz="800" dirty="0"/>
             </a:p>
@@ -3350,11 +3346,7 @@
             <a:p>
               <a:r>
                 <a:rPr lang="en-US" sz="800" dirty="0" smtClean="0"/>
-                <a:t>Targeting score for enrolling youth </a:t>
-              </a:r>
-              <a:r>
-                <a:rPr lang="en-US" sz="800" dirty="0" smtClean="0"/>
-                <a:t>between 50-100% FPL</a:t>
+                <a:t>Targeting score for enrolling youth between 50-100% FPL</a:t>
               </a:r>
               <a:endParaRPr lang="en-US" sz="800" dirty="0"/>
             </a:p>
@@ -3429,11 +3421,7 @@
             <a:p>
               <a:r>
                 <a:rPr lang="en-US" sz="800" dirty="0" smtClean="0"/>
-                <a:t>Targeting score for enrolling youth </a:t>
-              </a:r>
-              <a:r>
-                <a:rPr lang="en-US" sz="800" dirty="0" smtClean="0"/>
-                <a:t>between 100-200% FPL</a:t>
+                <a:t>Targeting score for enrolling youth between 100-200% FPL</a:t>
               </a:r>
               <a:endParaRPr lang="en-US" sz="800" dirty="0"/>
             </a:p>
@@ -3508,11 +3496,7 @@
             <a:p>
               <a:r>
                 <a:rPr lang="en-US" sz="800" dirty="0" smtClean="0"/>
-                <a:t>Targeting score for enrolling youth </a:t>
-              </a:r>
-              <a:r>
-                <a:rPr lang="en-US" sz="800" dirty="0" smtClean="0"/>
-                <a:t>greater than 200% FPL</a:t>
+                <a:t>Targeting score for enrolling youth greater than 200% FPL</a:t>
               </a:r>
               <a:endParaRPr lang="en-US" sz="800" dirty="0"/>
             </a:p>
@@ -3705,13 +3689,6 @@
               </a:rPr>
               <a:t>(Larger numbers increase run time, but can help find better solutions)</a:t>
             </a:r>
-            <a:endParaRPr lang="en-US" sz="800" dirty="0" smtClean="0">
-              <a:solidFill>
-                <a:schemeClr val="bg1">
-                  <a:lumMod val="65000"/>
-                </a:schemeClr>
-              </a:solidFill>
-            </a:endParaRPr>
           </a:p>
         </p:txBody>
       </p:sp>
@@ -4232,7 +4209,7 @@
         </p:blipFill>
         <p:spPr>
           <a:xfrm>
-            <a:off x="294954" y="6626071"/>
+            <a:off x="260664" y="6553199"/>
             <a:ext cx="3473136" cy="1393979"/>
           </a:xfrm>
           <a:prstGeom prst="rect">

</xml_diff>

<commit_message>
Minor method and wireframe updates
</commit_message>
<xml_diff>
--- a/write-ups/website-wireframe/wireframe.pptx
+++ b/write-ups/website-wireframe/wireframe.pptx
@@ -288,7 +288,7 @@
           <a:p>
             <a:fld id="{5033FC35-9855-4B3A-892F-0AC8F645192C}" type="datetimeFigureOut">
               <a:rPr lang="en-US" smtClean="0"/>
-              <a:t>9/9/2014</a:t>
+              <a:t>10/8/2014</a:t>
             </a:fld>
             <a:endParaRPr lang="en-US"/>
           </a:p>
@@ -458,7 +458,7 @@
           <a:p>
             <a:fld id="{5033FC35-9855-4B3A-892F-0AC8F645192C}" type="datetimeFigureOut">
               <a:rPr lang="en-US" smtClean="0"/>
-              <a:t>9/9/2014</a:t>
+              <a:t>10/8/2014</a:t>
             </a:fld>
             <a:endParaRPr lang="en-US"/>
           </a:p>
@@ -638,7 +638,7 @@
           <a:p>
             <a:fld id="{5033FC35-9855-4B3A-892F-0AC8F645192C}" type="datetimeFigureOut">
               <a:rPr lang="en-US" smtClean="0"/>
-              <a:t>9/9/2014</a:t>
+              <a:t>10/8/2014</a:t>
             </a:fld>
             <a:endParaRPr lang="en-US"/>
           </a:p>
@@ -808,7 +808,7 @@
           <a:p>
             <a:fld id="{5033FC35-9855-4B3A-892F-0AC8F645192C}" type="datetimeFigureOut">
               <a:rPr lang="en-US" smtClean="0"/>
-              <a:t>9/9/2014</a:t>
+              <a:t>10/8/2014</a:t>
             </a:fld>
             <a:endParaRPr lang="en-US"/>
           </a:p>
@@ -1054,7 +1054,7 @@
           <a:p>
             <a:fld id="{5033FC35-9855-4B3A-892F-0AC8F645192C}" type="datetimeFigureOut">
               <a:rPr lang="en-US" smtClean="0"/>
-              <a:t>9/9/2014</a:t>
+              <a:t>10/8/2014</a:t>
             </a:fld>
             <a:endParaRPr lang="en-US"/>
           </a:p>
@@ -1342,7 +1342,7 @@
           <a:p>
             <a:fld id="{5033FC35-9855-4B3A-892F-0AC8F645192C}" type="datetimeFigureOut">
               <a:rPr lang="en-US" smtClean="0"/>
-              <a:t>9/9/2014</a:t>
+              <a:t>10/8/2014</a:t>
             </a:fld>
             <a:endParaRPr lang="en-US"/>
           </a:p>
@@ -1764,7 +1764,7 @@
           <a:p>
             <a:fld id="{5033FC35-9855-4B3A-892F-0AC8F645192C}" type="datetimeFigureOut">
               <a:rPr lang="en-US" smtClean="0"/>
-              <a:t>9/9/2014</a:t>
+              <a:t>10/8/2014</a:t>
             </a:fld>
             <a:endParaRPr lang="en-US"/>
           </a:p>
@@ -1882,7 +1882,7 @@
           <a:p>
             <a:fld id="{5033FC35-9855-4B3A-892F-0AC8F645192C}" type="datetimeFigureOut">
               <a:rPr lang="en-US" smtClean="0"/>
-              <a:t>9/9/2014</a:t>
+              <a:t>10/8/2014</a:t>
             </a:fld>
             <a:endParaRPr lang="en-US"/>
           </a:p>
@@ -1977,7 +1977,7 @@
           <a:p>
             <a:fld id="{5033FC35-9855-4B3A-892F-0AC8F645192C}" type="datetimeFigureOut">
               <a:rPr lang="en-US" smtClean="0"/>
-              <a:t>9/9/2014</a:t>
+              <a:t>10/8/2014</a:t>
             </a:fld>
             <a:endParaRPr lang="en-US"/>
           </a:p>
@@ -2254,7 +2254,7 @@
           <a:p>
             <a:fld id="{5033FC35-9855-4B3A-892F-0AC8F645192C}" type="datetimeFigureOut">
               <a:rPr lang="en-US" smtClean="0"/>
-              <a:t>9/9/2014</a:t>
+              <a:t>10/8/2014</a:t>
             </a:fld>
             <a:endParaRPr lang="en-US"/>
           </a:p>
@@ -2507,7 +2507,7 @@
           <a:p>
             <a:fld id="{5033FC35-9855-4B3A-892F-0AC8F645192C}" type="datetimeFigureOut">
               <a:rPr lang="en-US" smtClean="0"/>
-              <a:t>9/9/2014</a:t>
+              <a:t>10/8/2014</a:t>
             </a:fld>
             <a:endParaRPr lang="en-US"/>
           </a:p>
@@ -2720,7 +2720,7 @@
           <a:p>
             <a:fld id="{5033FC35-9855-4B3A-892F-0AC8F645192C}" type="datetimeFigureOut">
               <a:rPr lang="en-US" smtClean="0"/>
-              <a:t>9/9/2014</a:t>
+              <a:t>10/8/2014</a:t>
             </a:fld>
             <a:endParaRPr lang="en-US"/>
           </a:p>
@@ -3242,9 +3242,9 @@
         <p:grpSpPr>
           <a:xfrm>
             <a:off x="186690" y="801461"/>
-            <a:ext cx="2480310" cy="356987"/>
+            <a:ext cx="2480310" cy="345433"/>
             <a:chOff x="186690" y="1147963"/>
-            <a:chExt cx="2175510" cy="356987"/>
+            <a:chExt cx="2175510" cy="345433"/>
           </a:xfrm>
         </p:grpSpPr>
         <p:sp>
@@ -3299,8 +3299,8 @@
           </p:blipFill>
           <p:spPr>
             <a:xfrm>
-              <a:off x="381000" y="1338463"/>
-              <a:ext cx="990600" cy="166487"/>
+              <a:off x="381000" y="1338464"/>
+              <a:ext cx="921850" cy="154932"/>
             </a:xfrm>
             <a:prstGeom prst="rect">
               <a:avLst/>
@@ -3383,156 +3383,66 @@
           </p:spPr>
         </p:pic>
       </p:grpSp>
-      <p:grpSp>
-        <p:nvGrpSpPr>
-          <p:cNvPr id="16" name="Group 15"/>
-          <p:cNvGrpSpPr/>
+      <p:sp>
+        <p:nvSpPr>
+          <p:cNvPr id="17" name="TextBox 16"/>
+          <p:cNvSpPr txBox="1"/>
           <p:nvPr/>
-        </p:nvGrpSpPr>
-        <p:grpSpPr>
+        </p:nvSpPr>
+        <p:spPr>
           <a:xfrm>
             <a:off x="186690" y="1626961"/>
-            <a:ext cx="2632710" cy="356987"/>
-            <a:chOff x="186690" y="1147963"/>
-            <a:chExt cx="2327910" cy="356987"/>
-          </a:xfrm>
-        </p:grpSpPr>
-        <p:sp>
-          <p:nvSpPr>
-            <p:cNvPr id="17" name="TextBox 16"/>
-            <p:cNvSpPr txBox="1"/>
-            <p:nvPr/>
-          </p:nvSpPr>
-          <p:spPr>
-            <a:xfrm>
-              <a:off x="186690" y="1147963"/>
-              <a:ext cx="2327910" cy="338554"/>
-            </a:xfrm>
-            <a:prstGeom prst="rect">
-              <a:avLst/>
-            </a:prstGeom>
-            <a:noFill/>
-          </p:spPr>
-          <p:txBody>
-            <a:bodyPr wrap="square" rtlCol="0">
-              <a:spAutoFit/>
-            </a:bodyPr>
-            <a:lstStyle/>
-            <a:p>
-              <a:r>
-                <a:rPr lang="en-US" sz="800" dirty="0" smtClean="0"/>
-                <a:t>Targeting score for enrolling youth between 100-200% FPL</a:t>
-              </a:r>
-              <a:endParaRPr lang="en-US" sz="800" dirty="0"/>
-            </a:p>
-          </p:txBody>
-        </p:sp>
-        <p:pic>
-          <p:nvPicPr>
-            <p:cNvPr id="18" name="Picture 17"/>
-            <p:cNvPicPr>
-              <a:picLocks noChangeAspect="1"/>
-            </p:cNvPicPr>
-            <p:nvPr/>
-          </p:nvPicPr>
-          <p:blipFill>
-            <a:blip r:embed="rId3" cstate="print">
-              <a:extLst>
-                <a:ext uri="{28A0092B-C50C-407E-A947-70E740481C1C}">
-                  <a14:useLocalDpi xmlns:a14="http://schemas.microsoft.com/office/drawing/2010/main" val="0"/>
-                </a:ext>
-              </a:extLst>
-            </a:blip>
-            <a:stretch>
-              <a:fillRect/>
-            </a:stretch>
-          </p:blipFill>
-          <p:spPr>
-            <a:xfrm>
-              <a:off x="381000" y="1338463"/>
-              <a:ext cx="990600" cy="166487"/>
-            </a:xfrm>
-            <a:prstGeom prst="rect">
-              <a:avLst/>
-            </a:prstGeom>
-          </p:spPr>
-        </p:pic>
-      </p:grpSp>
-      <p:grpSp>
-        <p:nvGrpSpPr>
-          <p:cNvPr id="19" name="Group 18"/>
-          <p:cNvGrpSpPr/>
+            <a:ext cx="2632710" cy="338554"/>
+          </a:xfrm>
+          <a:prstGeom prst="rect">
+            <a:avLst/>
+          </a:prstGeom>
+          <a:noFill/>
+        </p:spPr>
+        <p:txBody>
+          <a:bodyPr wrap="square" rtlCol="0">
+            <a:spAutoFit/>
+          </a:bodyPr>
+          <a:lstStyle/>
+          <a:p>
+            <a:r>
+              <a:rPr lang="en-US" sz="800" dirty="0" smtClean="0"/>
+              <a:t>Targeting score for enrolling youth between 100-200% FPL</a:t>
+            </a:r>
+            <a:endParaRPr lang="en-US" sz="800" dirty="0"/>
+          </a:p>
+        </p:txBody>
+      </p:sp>
+      <p:sp>
+        <p:nvSpPr>
+          <p:cNvPr id="20" name="TextBox 19"/>
+          <p:cNvSpPr txBox="1"/>
           <p:nvPr/>
-        </p:nvGrpSpPr>
-        <p:grpSpPr>
+        </p:nvSpPr>
+        <p:spPr>
           <a:xfrm>
             <a:off x="186690" y="2039711"/>
-            <a:ext cx="2632710" cy="356987"/>
-            <a:chOff x="186690" y="1147963"/>
-            <a:chExt cx="2632710" cy="356987"/>
-          </a:xfrm>
-        </p:grpSpPr>
-        <p:sp>
-          <p:nvSpPr>
-            <p:cNvPr id="20" name="TextBox 19"/>
-            <p:cNvSpPr txBox="1"/>
-            <p:nvPr/>
-          </p:nvSpPr>
-          <p:spPr>
-            <a:xfrm>
-              <a:off x="186690" y="1147963"/>
-              <a:ext cx="2632710" cy="215444"/>
-            </a:xfrm>
-            <a:prstGeom prst="rect">
-              <a:avLst/>
-            </a:prstGeom>
-            <a:noFill/>
-          </p:spPr>
-          <p:txBody>
-            <a:bodyPr wrap="square" rtlCol="0">
-              <a:spAutoFit/>
-            </a:bodyPr>
-            <a:lstStyle/>
-            <a:p>
-              <a:r>
-                <a:rPr lang="en-US" sz="800" dirty="0" smtClean="0"/>
-                <a:t>Targeting score for enrolling youth greater than 200% FPL</a:t>
-              </a:r>
-              <a:endParaRPr lang="en-US" sz="800" dirty="0"/>
-            </a:p>
-          </p:txBody>
-        </p:sp>
-        <p:pic>
-          <p:nvPicPr>
-            <p:cNvPr id="21" name="Picture 20"/>
-            <p:cNvPicPr>
-              <a:picLocks noChangeAspect="1"/>
-            </p:cNvPicPr>
-            <p:nvPr/>
-          </p:nvPicPr>
-          <p:blipFill>
-            <a:blip r:embed="rId3" cstate="print">
-              <a:extLst>
-                <a:ext uri="{28A0092B-C50C-407E-A947-70E740481C1C}">
-                  <a14:useLocalDpi xmlns:a14="http://schemas.microsoft.com/office/drawing/2010/main" val="0"/>
-                </a:ext>
-              </a:extLst>
-            </a:blip>
-            <a:stretch>
-              <a:fillRect/>
-            </a:stretch>
-          </p:blipFill>
-          <p:spPr>
-            <a:xfrm>
-              <a:off x="381000" y="1338463"/>
-              <a:ext cx="990600" cy="166487"/>
-            </a:xfrm>
-            <a:prstGeom prst="rect">
-              <a:avLst/>
-            </a:prstGeom>
-          </p:spPr>
-        </p:pic>
-      </p:grpSp>
+            <a:ext cx="2632710" cy="215444"/>
+          </a:xfrm>
+          <a:prstGeom prst="rect">
+            <a:avLst/>
+          </a:prstGeom>
+          <a:noFill/>
+        </p:spPr>
+        <p:txBody>
+          <a:bodyPr wrap="square" rtlCol="0">
+            <a:spAutoFit/>
+          </a:bodyPr>
+          <a:lstStyle/>
+          <a:p>
+            <a:r>
+              <a:rPr lang="en-US" sz="800" dirty="0" smtClean="0"/>
+              <a:t>Targeting score for enrolling youth greater than 200% FPL</a:t>
+            </a:r>
+            <a:endParaRPr lang="en-US" sz="800" dirty="0"/>
+          </a:p>
+        </p:txBody>
+      </p:sp>
       <p:sp>
         <p:nvSpPr>
           <p:cNvPr id="22" name="Rectangle 21"/>
@@ -4241,6 +4151,66 @@
           <a:xfrm>
             <a:off x="3276600" y="8050530"/>
             <a:ext cx="491489" cy="491489"/>
+          </a:xfrm>
+          <a:prstGeom prst="rect">
+            <a:avLst/>
+          </a:prstGeom>
+        </p:spPr>
+      </p:pic>
+      <p:pic>
+        <p:nvPicPr>
+          <p:cNvPr id="39" name="Picture 38"/>
+          <p:cNvPicPr>
+            <a:picLocks noChangeAspect="1"/>
+          </p:cNvPicPr>
+          <p:nvPr/>
+        </p:nvPicPr>
+        <p:blipFill>
+          <a:blip r:embed="rId3" cstate="print">
+            <a:extLst>
+              <a:ext uri="{28A0092B-C50C-407E-A947-70E740481C1C}">
+                <a14:useLocalDpi xmlns:a14="http://schemas.microsoft.com/office/drawing/2010/main" val="0"/>
+              </a:ext>
+            </a:extLst>
+          </a:blip>
+          <a:stretch>
+            <a:fillRect/>
+          </a:stretch>
+        </p:blipFill>
+        <p:spPr>
+          <a:xfrm>
+            <a:off x="400050" y="1852813"/>
+            <a:ext cx="1087877" cy="166487"/>
+          </a:xfrm>
+          <a:prstGeom prst="rect">
+            <a:avLst/>
+          </a:prstGeom>
+        </p:spPr>
+      </p:pic>
+      <p:pic>
+        <p:nvPicPr>
+          <p:cNvPr id="41" name="Picture 40"/>
+          <p:cNvPicPr>
+            <a:picLocks noChangeAspect="1"/>
+          </p:cNvPicPr>
+          <p:nvPr/>
+        </p:nvPicPr>
+        <p:blipFill>
+          <a:blip r:embed="rId3" cstate="print">
+            <a:extLst>
+              <a:ext uri="{28A0092B-C50C-407E-A947-70E740481C1C}">
+                <a14:useLocalDpi xmlns:a14="http://schemas.microsoft.com/office/drawing/2010/main" val="0"/>
+              </a:ext>
+            </a:extLst>
+          </a:blip>
+          <a:stretch>
+            <a:fillRect/>
+          </a:stretch>
+        </p:blipFill>
+        <p:spPr>
+          <a:xfrm>
+            <a:off x="390525" y="2233813"/>
+            <a:ext cx="1087877" cy="166487"/>
           </a:xfrm>
           <a:prstGeom prst="rect">
             <a:avLst/>

</xml_diff>

<commit_message>
Batch changes to demo, wireframe, and documentation
</commit_message>
<xml_diff>
--- a/write-ups/website-wireframe/wireframe.pptx
+++ b/write-ups/website-wireframe/wireframe.pptx
@@ -288,7 +288,7 @@
           <a:p>
             <a:fld id="{5033FC35-9855-4B3A-892F-0AC8F645192C}" type="datetimeFigureOut">
               <a:rPr lang="en-US" smtClean="0"/>
-              <a:t>9/9/2014</a:t>
+              <a:t>9/20/2014</a:t>
             </a:fld>
             <a:endParaRPr lang="en-US"/>
           </a:p>
@@ -458,7 +458,7 @@
           <a:p>
             <a:fld id="{5033FC35-9855-4B3A-892F-0AC8F645192C}" type="datetimeFigureOut">
               <a:rPr lang="en-US" smtClean="0"/>
-              <a:t>9/9/2014</a:t>
+              <a:t>9/20/2014</a:t>
             </a:fld>
             <a:endParaRPr lang="en-US"/>
           </a:p>
@@ -638,7 +638,7 @@
           <a:p>
             <a:fld id="{5033FC35-9855-4B3A-892F-0AC8F645192C}" type="datetimeFigureOut">
               <a:rPr lang="en-US" smtClean="0"/>
-              <a:t>9/9/2014</a:t>
+              <a:t>9/20/2014</a:t>
             </a:fld>
             <a:endParaRPr lang="en-US"/>
           </a:p>
@@ -808,7 +808,7 @@
           <a:p>
             <a:fld id="{5033FC35-9855-4B3A-892F-0AC8F645192C}" type="datetimeFigureOut">
               <a:rPr lang="en-US" smtClean="0"/>
-              <a:t>9/9/2014</a:t>
+              <a:t>9/20/2014</a:t>
             </a:fld>
             <a:endParaRPr lang="en-US"/>
           </a:p>
@@ -1054,7 +1054,7 @@
           <a:p>
             <a:fld id="{5033FC35-9855-4B3A-892F-0AC8F645192C}" type="datetimeFigureOut">
               <a:rPr lang="en-US" smtClean="0"/>
-              <a:t>9/9/2014</a:t>
+              <a:t>9/20/2014</a:t>
             </a:fld>
             <a:endParaRPr lang="en-US"/>
           </a:p>
@@ -1342,7 +1342,7 @@
           <a:p>
             <a:fld id="{5033FC35-9855-4B3A-892F-0AC8F645192C}" type="datetimeFigureOut">
               <a:rPr lang="en-US" smtClean="0"/>
-              <a:t>9/9/2014</a:t>
+              <a:t>9/20/2014</a:t>
             </a:fld>
             <a:endParaRPr lang="en-US"/>
           </a:p>
@@ -1764,7 +1764,7 @@
           <a:p>
             <a:fld id="{5033FC35-9855-4B3A-892F-0AC8F645192C}" type="datetimeFigureOut">
               <a:rPr lang="en-US" smtClean="0"/>
-              <a:t>9/9/2014</a:t>
+              <a:t>9/20/2014</a:t>
             </a:fld>
             <a:endParaRPr lang="en-US"/>
           </a:p>
@@ -1882,7 +1882,7 @@
           <a:p>
             <a:fld id="{5033FC35-9855-4B3A-892F-0AC8F645192C}" type="datetimeFigureOut">
               <a:rPr lang="en-US" smtClean="0"/>
-              <a:t>9/9/2014</a:t>
+              <a:t>9/20/2014</a:t>
             </a:fld>
             <a:endParaRPr lang="en-US"/>
           </a:p>
@@ -1977,7 +1977,7 @@
           <a:p>
             <a:fld id="{5033FC35-9855-4B3A-892F-0AC8F645192C}" type="datetimeFigureOut">
               <a:rPr lang="en-US" smtClean="0"/>
-              <a:t>9/9/2014</a:t>
+              <a:t>9/20/2014</a:t>
             </a:fld>
             <a:endParaRPr lang="en-US"/>
           </a:p>
@@ -2254,7 +2254,7 @@
           <a:p>
             <a:fld id="{5033FC35-9855-4B3A-892F-0AC8F645192C}" type="datetimeFigureOut">
               <a:rPr lang="en-US" smtClean="0"/>
-              <a:t>9/9/2014</a:t>
+              <a:t>9/20/2014</a:t>
             </a:fld>
             <a:endParaRPr lang="en-US"/>
           </a:p>
@@ -2507,7 +2507,7 @@
           <a:p>
             <a:fld id="{5033FC35-9855-4B3A-892F-0AC8F645192C}" type="datetimeFigureOut">
               <a:rPr lang="en-US" smtClean="0"/>
-              <a:t>9/9/2014</a:t>
+              <a:t>9/20/2014</a:t>
             </a:fld>
             <a:endParaRPr lang="en-US"/>
           </a:p>
@@ -2720,7 +2720,7 @@
           <a:p>
             <a:fld id="{5033FC35-9855-4B3A-892F-0AC8F645192C}" type="datetimeFigureOut">
               <a:rPr lang="en-US" smtClean="0"/>
-              <a:t>9/9/2014</a:t>
+              <a:t>9/20/2014</a:t>
             </a:fld>
             <a:endParaRPr lang="en-US"/>
           </a:p>
@@ -3242,7 +3242,7 @@
         <p:grpSpPr>
           <a:xfrm>
             <a:off x="186690" y="801461"/>
-            <a:ext cx="2480310" cy="356987"/>
+            <a:ext cx="2655570" cy="356987"/>
             <a:chOff x="186690" y="1147963"/>
             <a:chExt cx="2175510" cy="356987"/>
           </a:xfrm>
@@ -3299,8 +3299,8 @@
           </p:blipFill>
           <p:spPr>
             <a:xfrm>
-              <a:off x="381000" y="1338463"/>
-              <a:ext cx="990600" cy="166487"/>
+              <a:off x="381001" y="1338463"/>
+              <a:ext cx="935270" cy="166487"/>
             </a:xfrm>
             <a:prstGeom prst="rect">
               <a:avLst/>
@@ -3317,7 +3317,7 @@
         <p:grpSpPr>
           <a:xfrm>
             <a:off x="186690" y="1214211"/>
-            <a:ext cx="2556510" cy="356987"/>
+            <a:ext cx="2708910" cy="356987"/>
             <a:chOff x="186690" y="1147963"/>
             <a:chExt cx="2327910" cy="356987"/>
           </a:xfrm>
@@ -3450,7 +3450,7 @@
           <p:spPr>
             <a:xfrm>
               <a:off x="381000" y="1338463"/>
-              <a:ext cx="990600" cy="166487"/>
+              <a:ext cx="1024895" cy="166487"/>
             </a:xfrm>
             <a:prstGeom prst="rect">
               <a:avLst/>
@@ -3524,8 +3524,8 @@
           </p:blipFill>
           <p:spPr>
             <a:xfrm>
-              <a:off x="381000" y="1338463"/>
-              <a:ext cx="990600" cy="166487"/>
+              <a:off x="380999" y="1338463"/>
+              <a:ext cx="1184531" cy="166487"/>
             </a:xfrm>
             <a:prstGeom prst="rect">
               <a:avLst/>
@@ -3731,7 +3731,7 @@
           <p:nvPr/>
         </p:nvPicPr>
         <p:blipFill>
-          <a:blip r:embed="rId4">
+          <a:blip r:embed="rId4" cstate="print">
             <a:extLst>
               <a:ext uri="{28A0092B-C50C-407E-A947-70E740481C1C}">
                 <a14:useLocalDpi xmlns:a14="http://schemas.microsoft.com/office/drawing/2010/main" val="0"/>
@@ -3744,8 +3744,8 @@
         </p:blipFill>
         <p:spPr bwMode="auto">
           <a:xfrm>
-            <a:off x="152400" y="4401126"/>
-            <a:ext cx="3586790" cy="2152073"/>
+            <a:off x="209550" y="4412556"/>
+            <a:ext cx="3133579" cy="2152073"/>
           </a:xfrm>
           <a:prstGeom prst="rect">
             <a:avLst/>
@@ -3897,8 +3897,8 @@
           </p:blipFill>
           <p:spPr>
             <a:xfrm>
-              <a:off x="2190751" y="2533832"/>
-              <a:ext cx="2000250" cy="202098"/>
+              <a:off x="2190751" y="2550549"/>
+              <a:ext cx="2000250" cy="168663"/>
             </a:xfrm>
             <a:prstGeom prst="rect">
               <a:avLst/>
@@ -3929,7 +3929,19 @@
             <a:p>
               <a:r>
                 <a:rPr lang="en-US" sz="800" dirty="0" smtClean="0"/>
-                <a:t>Running CANOPY Iteration 38,000 of 100,000</a:t>
+                <a:t>Running CANOPY Iteration </a:t>
+              </a:r>
+              <a:r>
+                <a:rPr lang="en-US" sz="800" dirty="0" smtClean="0"/>
+                <a:t>82</a:t>
+              </a:r>
+              <a:r>
+                <a:rPr lang="en-US" sz="800" dirty="0" smtClean="0"/>
+                <a:t>,000 </a:t>
+              </a:r>
+              <a:r>
+                <a:rPr lang="en-US" sz="800" dirty="0" smtClean="0"/>
+                <a:t>of 100,000</a:t>
               </a:r>
               <a:endParaRPr lang="en-US" sz="800" dirty="0"/>
             </a:p>
@@ -3945,7 +3957,7 @@
         <p:spPr>
           <a:xfrm>
             <a:off x="3810000" y="4572000"/>
-            <a:ext cx="2743200" cy="3016210"/>
+            <a:ext cx="2743200" cy="2862322"/>
           </a:xfrm>
           <a:prstGeom prst="rect">
             <a:avLst/>
@@ -3973,7 +3985,15 @@
             </a:pPr>
             <a:r>
               <a:rPr lang="en-US" sz="1000" dirty="0" smtClean="0"/>
-              <a:t>The “Uniform Allocation Option” is the TS obtained by evenly (as possible) distributing resources across all sites.</a:t>
+              <a:t>The “Uniform </a:t>
+            </a:r>
+            <a:r>
+              <a:rPr lang="en-US" sz="1000" dirty="0" smtClean="0"/>
+              <a:t>Distribution” </a:t>
+            </a:r>
+            <a:r>
+              <a:rPr lang="en-US" sz="1000" dirty="0" smtClean="0"/>
+              <a:t>is the TS obtained by evenly (as possible) distributing resources across all sites.</a:t>
             </a:r>
           </a:p>
           <a:p>
@@ -3991,7 +4011,15 @@
             </a:r>
             <a:r>
               <a:rPr lang="en-US" sz="1000" dirty="0" smtClean="0"/>
-              <a:t> proportional to pop density” TS is based on allocating resources to sites in proportion to the population density within 1 mile of the site.</a:t>
+              <a:t> </a:t>
+            </a:r>
+            <a:r>
+              <a:rPr lang="en-US" sz="1000" dirty="0" smtClean="0"/>
+              <a:t>Based on Density</a:t>
+            </a:r>
+            <a:r>
+              <a:rPr lang="en-US" sz="1000" dirty="0" smtClean="0"/>
+              <a:t>” TS is based on allocating resources to sites in proportion to the population density within 1 mile of the site.</a:t>
             </a:r>
           </a:p>
           <a:p>
@@ -4009,7 +4037,15 @@
             </a:r>
             <a:r>
               <a:rPr lang="en-US" sz="1000" dirty="0" smtClean="0"/>
-              <a:t> proportional to poverty” TS is based on allocating resources to sites in proportion to the poverty rate within 1 mile of the site.</a:t>
+              <a:t> </a:t>
+            </a:r>
+            <a:r>
+              <a:rPr lang="en-US" sz="1000" dirty="0" smtClean="0"/>
+              <a:t>Based on Poverty” </a:t>
+            </a:r>
+            <a:r>
+              <a:rPr lang="en-US" sz="1000" dirty="0" smtClean="0"/>
+              <a:t>TS is based on allocating resources to sites in proportion to the poverty rate within 1 mile of the site.</a:t>
             </a:r>
           </a:p>
           <a:p>

</xml_diff>